<commit_message>
update figures and all
</commit_message>
<xml_diff>
--- a/Figure_7_and_8_Discussion_2D_slices/ChiEffvsChirpMass_withLabels.pptx
+++ b/Figure_7_and_8_Discussion_2D_slices/ChiEffvsChirpMass_withLabels.pptx
@@ -208,7 +208,7 @@
           <a:p>
             <a:fld id="{4F2C78FE-0AE4-4048-A852-10652A981FB4}" type="datetimeFigureOut">
               <a:rPr lang="en-US" smtClean="0"/>
-              <a:t>4/3/22</a:t>
+              <a:t>4/4/22</a:t>
             </a:fld>
             <a:endParaRPr lang="en-US"/>
           </a:p>
@@ -728,7 +728,7 @@
           <a:p>
             <a:fld id="{9CE5716F-23E9-B14C-9CA7-D46EC6EDF8E0}" type="datetimeFigureOut">
               <a:rPr lang="en-US" smtClean="0"/>
-              <a:t>4/3/22</a:t>
+              <a:t>4/4/22</a:t>
             </a:fld>
             <a:endParaRPr lang="en-US"/>
           </a:p>
@@ -898,7 +898,7 @@
           <a:p>
             <a:fld id="{9CE5716F-23E9-B14C-9CA7-D46EC6EDF8E0}" type="datetimeFigureOut">
               <a:rPr lang="en-US" smtClean="0"/>
-              <a:t>4/3/22</a:t>
+              <a:t>4/4/22</a:t>
             </a:fld>
             <a:endParaRPr lang="en-US"/>
           </a:p>
@@ -1078,7 +1078,7 @@
           <a:p>
             <a:fld id="{9CE5716F-23E9-B14C-9CA7-D46EC6EDF8E0}" type="datetimeFigureOut">
               <a:rPr lang="en-US" smtClean="0"/>
-              <a:t>4/3/22</a:t>
+              <a:t>4/4/22</a:t>
             </a:fld>
             <a:endParaRPr lang="en-US"/>
           </a:p>
@@ -1248,7 +1248,7 @@
           <a:p>
             <a:fld id="{9CE5716F-23E9-B14C-9CA7-D46EC6EDF8E0}" type="datetimeFigureOut">
               <a:rPr lang="en-US" smtClean="0"/>
-              <a:t>4/3/22</a:t>
+              <a:t>4/4/22</a:t>
             </a:fld>
             <a:endParaRPr lang="en-US"/>
           </a:p>
@@ -1494,7 +1494,7 @@
           <a:p>
             <a:fld id="{9CE5716F-23E9-B14C-9CA7-D46EC6EDF8E0}" type="datetimeFigureOut">
               <a:rPr lang="en-US" smtClean="0"/>
-              <a:t>4/3/22</a:t>
+              <a:t>4/4/22</a:t>
             </a:fld>
             <a:endParaRPr lang="en-US"/>
           </a:p>
@@ -1726,7 +1726,7 @@
           <a:p>
             <a:fld id="{9CE5716F-23E9-B14C-9CA7-D46EC6EDF8E0}" type="datetimeFigureOut">
               <a:rPr lang="en-US" smtClean="0"/>
-              <a:t>4/3/22</a:t>
+              <a:t>4/4/22</a:t>
             </a:fld>
             <a:endParaRPr lang="en-US"/>
           </a:p>
@@ -2093,7 +2093,7 @@
           <a:p>
             <a:fld id="{9CE5716F-23E9-B14C-9CA7-D46EC6EDF8E0}" type="datetimeFigureOut">
               <a:rPr lang="en-US" smtClean="0"/>
-              <a:t>4/3/22</a:t>
+              <a:t>4/4/22</a:t>
             </a:fld>
             <a:endParaRPr lang="en-US"/>
           </a:p>
@@ -2211,7 +2211,7 @@
           <a:p>
             <a:fld id="{9CE5716F-23E9-B14C-9CA7-D46EC6EDF8E0}" type="datetimeFigureOut">
               <a:rPr lang="en-US" smtClean="0"/>
-              <a:t>4/3/22</a:t>
+              <a:t>4/4/22</a:t>
             </a:fld>
             <a:endParaRPr lang="en-US"/>
           </a:p>
@@ -2306,7 +2306,7 @@
           <a:p>
             <a:fld id="{9CE5716F-23E9-B14C-9CA7-D46EC6EDF8E0}" type="datetimeFigureOut">
               <a:rPr lang="en-US" smtClean="0"/>
-              <a:t>4/3/22</a:t>
+              <a:t>4/4/22</a:t>
             </a:fld>
             <a:endParaRPr lang="en-US"/>
           </a:p>
@@ -2583,7 +2583,7 @@
           <a:p>
             <a:fld id="{9CE5716F-23E9-B14C-9CA7-D46EC6EDF8E0}" type="datetimeFigureOut">
               <a:rPr lang="en-US" smtClean="0"/>
-              <a:t>4/3/22</a:t>
+              <a:t>4/4/22</a:t>
             </a:fld>
             <a:endParaRPr lang="en-US"/>
           </a:p>
@@ -2840,7 +2840,7 @@
           <a:p>
             <a:fld id="{9CE5716F-23E9-B14C-9CA7-D46EC6EDF8E0}" type="datetimeFigureOut">
               <a:rPr lang="en-US" smtClean="0"/>
-              <a:t>4/3/22</a:t>
+              <a:t>4/4/22</a:t>
             </a:fld>
             <a:endParaRPr lang="en-US"/>
           </a:p>
@@ -3053,7 +3053,7 @@
           <a:p>
             <a:fld id="{9CE5716F-23E9-B14C-9CA7-D46EC6EDF8E0}" type="datetimeFigureOut">
               <a:rPr lang="en-US" smtClean="0"/>
-              <a:t>4/3/22</a:t>
+              <a:t>4/4/22</a:t>
             </a:fld>
             <a:endParaRPr lang="en-US"/>
           </a:p>
@@ -3788,6 +3788,82 @@
                 <a:cs typeface="Times New Roman" panose="02020603050405020304" pitchFamily="18" charset="0"/>
               </a:rPr>
               <a:t>GW170729</a:t>
+            </a:r>
+          </a:p>
+        </p:txBody>
+      </p:sp>
+      <p:sp>
+        <p:nvSpPr>
+          <p:cNvPr id="12" name="TextBox 11">
+            <a:extLst>
+              <a:ext uri="{FF2B5EF4-FFF2-40B4-BE49-F238E27FC236}">
+                <a16:creationId xmlns:a16="http://schemas.microsoft.com/office/drawing/2014/main" id="{2FC9DCDB-986C-1943-9700-F4E1CD3367E1}"/>
+              </a:ext>
+            </a:extLst>
+          </p:cNvPr>
+          <p:cNvSpPr txBox="1"/>
+          <p:nvPr/>
+        </p:nvSpPr>
+        <p:spPr>
+          <a:xfrm>
+            <a:off x="770327" y="133217"/>
+            <a:ext cx="920445" cy="461665"/>
+          </a:xfrm>
+          <a:prstGeom prst="rect">
+            <a:avLst/>
+          </a:prstGeom>
+          <a:noFill/>
+        </p:spPr>
+        <p:txBody>
+          <a:bodyPr wrap="none" rtlCol="0">
+            <a:spAutoFit/>
+          </a:bodyPr>
+          <a:lstStyle/>
+          <a:p>
+            <a:r>
+              <a:rPr lang="en-US" sz="2400" b="1" dirty="0">
+                <a:latin typeface="Times New Roman" panose="02020603050405020304" pitchFamily="18" charset="0"/>
+                <a:cs typeface="Times New Roman" panose="02020603050405020304" pitchFamily="18" charset="0"/>
+              </a:rPr>
+              <a:t>MRR</a:t>
+            </a:r>
+          </a:p>
+        </p:txBody>
+      </p:sp>
+      <p:sp>
+        <p:nvSpPr>
+          <p:cNvPr id="13" name="TextBox 12">
+            <a:extLst>
+              <a:ext uri="{FF2B5EF4-FFF2-40B4-BE49-F238E27FC236}">
+                <a16:creationId xmlns:a16="http://schemas.microsoft.com/office/drawing/2014/main" id="{B34B49F7-2FCA-8E4F-B923-A3A6BED6A518}"/>
+              </a:ext>
+            </a:extLst>
+          </p:cNvPr>
+          <p:cNvSpPr txBox="1"/>
+          <p:nvPr/>
+        </p:nvSpPr>
+        <p:spPr>
+          <a:xfrm>
+            <a:off x="6774866" y="133216"/>
+            <a:ext cx="1519968" cy="461665"/>
+          </a:xfrm>
+          <a:prstGeom prst="rect">
+            <a:avLst/>
+          </a:prstGeom>
+          <a:noFill/>
+        </p:spPr>
+        <p:txBody>
+          <a:bodyPr wrap="none" rtlCol="0">
+            <a:spAutoFit/>
+          </a:bodyPr>
+          <a:lstStyle/>
+          <a:p>
+            <a:r>
+              <a:rPr lang="en-US" sz="2400" b="1" dirty="0">
+                <a:latin typeface="Times New Roman" panose="02020603050405020304" pitchFamily="18" charset="0"/>
+                <a:cs typeface="Times New Roman" panose="02020603050405020304" pitchFamily="18" charset="0"/>
+              </a:rPr>
+              <a:t>non-MRR</a:t>
             </a:r>
           </a:p>
         </p:txBody>

</xml_diff>